<commit_message>
Some fixes found during lab
</commit_message>
<xml_diff>
--- a/Docs/WMUG Saturday - ImageBuilder.pptx
+++ b/Docs/WMUG Saturday - ImageBuilder.pptx
@@ -123,6 +123,18 @@
 </p:presentation>
 </file>
 
+<file path=ppt/commentAuthors.xml><?xml version="1.0" encoding="utf-8"?>
+<p:cmAuthorLst xmlns:a="http://schemas.openxmlformats.org/drawingml/2006/main" xmlns:r="http://schemas.openxmlformats.org/officeDocument/2006/relationships" xmlns:p="http://schemas.openxmlformats.org/presentationml/2006/main">
+  <p:cmAuthor id="1" name="Arjan Bakker" initials="AB" lastIdx="0" clrIdx="0">
+    <p:extLst>
+      <p:ext uri="{19B8F6BF-5375-455C-9EA6-DF929625EA0E}">
+        <p15:presenceInfo xmlns:p15="http://schemas.microsoft.com/office/powerpoint/2012/main" userId="9e2ffe7a6be4d821" providerId="Windows Live"/>
+      </p:ext>
+    </p:extLst>
+  </p:cmAuthor>
+</p:cmAuthorLst>
+</file>
+
 <file path=ppt/notesMasters/notesMaster1.xml><?xml version="1.0" encoding="utf-8"?>
 <p:notesMaster xmlns:a="http://schemas.openxmlformats.org/drawingml/2006/main" xmlns:r="http://schemas.openxmlformats.org/officeDocument/2006/relationships" xmlns:p="http://schemas.openxmlformats.org/presentationml/2006/main">
   <p:cSld>
@@ -205,7 +217,7 @@
           <a:p>
             <a:fld id="{C5B2039A-C3F0-4167-B517-AA588B2FE38C}" type="datetimeFigureOut">
               <a:rPr lang="nl-NL" smtClean="0"/>
-              <a:t>22-6-2018</a:t>
+              <a:t>23-6-2018</a:t>
             </a:fld>
             <a:endParaRPr lang="nl-NL"/>
           </a:p>
@@ -364,7 +376,7 @@
           <a:p>
             <a:fld id="{6A419C26-D62F-467E-AEE6-E82DC2AD7544}" type="slidenum">
               <a:rPr lang="nl-NL" smtClean="0"/>
-              <a:t>‹#›</a:t>
+              <a:t>‹nr.›</a:t>
             </a:fld>
             <a:endParaRPr lang="nl-NL"/>
           </a:p>
@@ -928,7 +940,7 @@
           <a:p>
             <a:fld id="{FD6F2A06-8D0A-4A57-9924-FB892678AD6D}" type="datetimeFigureOut">
               <a:rPr lang="nl-NL" smtClean="0"/>
-              <a:t>22-6-2018</a:t>
+              <a:t>23-6-2018</a:t>
             </a:fld>
             <a:endParaRPr lang="nl-NL"/>
           </a:p>
@@ -970,7 +982,7 @@
           <a:p>
             <a:fld id="{3031DB92-8ECB-4A20-B8C8-F7B43E9CBB05}" type="slidenum">
               <a:rPr lang="nl-NL" smtClean="0"/>
-              <a:t>‹#›</a:t>
+              <a:t>‹nr.›</a:t>
             </a:fld>
             <a:endParaRPr lang="nl-NL"/>
           </a:p>
@@ -1200,7 +1212,7 @@
           <a:p>
             <a:fld id="{FD6F2A06-8D0A-4A57-9924-FB892678AD6D}" type="datetimeFigureOut">
               <a:rPr lang="nl-NL" smtClean="0"/>
-              <a:t>22-6-2018</a:t>
+              <a:t>23-6-2018</a:t>
             </a:fld>
             <a:endParaRPr lang="nl-NL"/>
           </a:p>
@@ -1242,7 +1254,7 @@
           <a:p>
             <a:fld id="{3031DB92-8ECB-4A20-B8C8-F7B43E9CBB05}" type="slidenum">
               <a:rPr lang="nl-NL" smtClean="0"/>
-              <a:t>‹#›</a:t>
+              <a:t>‹nr.›</a:t>
             </a:fld>
             <a:endParaRPr lang="nl-NL"/>
           </a:p>
@@ -1543,7 +1555,7 @@
           <a:p>
             <a:fld id="{FD6F2A06-8D0A-4A57-9924-FB892678AD6D}" type="datetimeFigureOut">
               <a:rPr lang="nl-NL" smtClean="0"/>
-              <a:t>22-6-2018</a:t>
+              <a:t>23-6-2018</a:t>
             </a:fld>
             <a:endParaRPr lang="nl-NL"/>
           </a:p>
@@ -1585,7 +1597,7 @@
           <a:p>
             <a:fld id="{3031DB92-8ECB-4A20-B8C8-F7B43E9CBB05}" type="slidenum">
               <a:rPr lang="nl-NL" smtClean="0"/>
-              <a:t>‹#›</a:t>
+              <a:t>‹nr.›</a:t>
             </a:fld>
             <a:endParaRPr lang="nl-NL"/>
           </a:p>
@@ -1848,7 +1860,7 @@
           <a:p>
             <a:fld id="{FD6F2A06-8D0A-4A57-9924-FB892678AD6D}" type="datetimeFigureOut">
               <a:rPr lang="nl-NL" smtClean="0"/>
-              <a:t>22-6-2018</a:t>
+              <a:t>23-6-2018</a:t>
             </a:fld>
             <a:endParaRPr lang="nl-NL"/>
           </a:p>
@@ -1890,7 +1902,7 @@
           <a:p>
             <a:fld id="{3031DB92-8ECB-4A20-B8C8-F7B43E9CBB05}" type="slidenum">
               <a:rPr lang="nl-NL" smtClean="0"/>
-              <a:t>‹#›</a:t>
+              <a:t>‹nr.›</a:t>
             </a:fld>
             <a:endParaRPr lang="nl-NL"/>
           </a:p>
@@ -2227,7 +2239,7 @@
           <a:p>
             <a:fld id="{FD6F2A06-8D0A-4A57-9924-FB892678AD6D}" type="datetimeFigureOut">
               <a:rPr lang="nl-NL" smtClean="0"/>
-              <a:t>22-6-2018</a:t>
+              <a:t>23-6-2018</a:t>
             </a:fld>
             <a:endParaRPr lang="nl-NL"/>
           </a:p>
@@ -2269,7 +2281,7 @@
           <a:p>
             <a:fld id="{3031DB92-8ECB-4A20-B8C8-F7B43E9CBB05}" type="slidenum">
               <a:rPr lang="nl-NL" smtClean="0"/>
-              <a:t>‹#›</a:t>
+              <a:t>‹nr.›</a:t>
             </a:fld>
             <a:endParaRPr lang="nl-NL"/>
           </a:p>
@@ -2345,7 +2357,7 @@
           <a:p>
             <a:fld id="{FD6F2A06-8D0A-4A57-9924-FB892678AD6D}" type="datetimeFigureOut">
               <a:rPr lang="nl-NL" smtClean="0"/>
-              <a:t>22-6-2018</a:t>
+              <a:t>23-6-2018</a:t>
             </a:fld>
             <a:endParaRPr lang="nl-NL"/>
           </a:p>
@@ -2387,7 +2399,7 @@
           <a:p>
             <a:fld id="{3031DB92-8ECB-4A20-B8C8-F7B43E9CBB05}" type="slidenum">
               <a:rPr lang="nl-NL" smtClean="0"/>
-              <a:t>‹#›</a:t>
+              <a:t>‹nr.›</a:t>
             </a:fld>
             <a:endParaRPr lang="nl-NL"/>
           </a:p>
@@ -2516,7 +2528,7 @@
           <a:p>
             <a:fld id="{FD6F2A06-8D0A-4A57-9924-FB892678AD6D}" type="datetimeFigureOut">
               <a:rPr lang="nl-NL" smtClean="0"/>
-              <a:t>22-6-2018</a:t>
+              <a:t>23-6-2018</a:t>
             </a:fld>
             <a:endParaRPr lang="nl-NL"/>
           </a:p>
@@ -2566,7 +2578,7 @@
           <a:p>
             <a:fld id="{3031DB92-8ECB-4A20-B8C8-F7B43E9CBB05}" type="slidenum">
               <a:rPr lang="nl-NL" smtClean="0"/>
-              <a:t>‹#›</a:t>
+              <a:t>‹nr.›</a:t>
             </a:fld>
             <a:endParaRPr lang="nl-NL"/>
           </a:p>
@@ -2900,7 +2912,7 @@
           <a:p>
             <a:fld id="{FD6F2A06-8D0A-4A57-9924-FB892678AD6D}" type="datetimeFigureOut">
               <a:rPr lang="nl-NL" smtClean="0"/>
-              <a:t>22-6-2018</a:t>
+              <a:t>23-6-2018</a:t>
             </a:fld>
             <a:endParaRPr lang="nl-NL"/>
           </a:p>
@@ -2963,7 +2975,7 @@
           <a:p>
             <a:fld id="{3031DB92-8ECB-4A20-B8C8-F7B43E9CBB05}" type="slidenum">
               <a:rPr lang="nl-NL" smtClean="0"/>
-              <a:t>‹#›</a:t>
+              <a:t>‹nr.›</a:t>
             </a:fld>
             <a:endParaRPr lang="nl-NL"/>
           </a:p>
@@ -3238,7 +3250,7 @@
           <a:p>
             <a:fld id="{FD6F2A06-8D0A-4A57-9924-FB892678AD6D}" type="datetimeFigureOut">
               <a:rPr lang="nl-NL" smtClean="0"/>
-              <a:t>22-6-2018</a:t>
+              <a:t>23-6-2018</a:t>
             </a:fld>
             <a:endParaRPr lang="nl-NL"/>
           </a:p>
@@ -3312,7 +3324,7 @@
           <a:p>
             <a:fld id="{3031DB92-8ECB-4A20-B8C8-F7B43E9CBB05}" type="slidenum">
               <a:rPr lang="nl-NL" smtClean="0"/>
-              <a:t>‹#›</a:t>
+              <a:t>‹nr.›</a:t>
             </a:fld>
             <a:endParaRPr lang="nl-NL"/>
           </a:p>
@@ -4931,7 +4943,7 @@
         <p:spPr/>
         <p:txBody>
           <a:bodyPr>
-            <a:normAutofit lnSpcReduction="10000"/>
+            <a:normAutofit fontScale="85000" lnSpcReduction="10000"/>
           </a:bodyPr>
           <a:lstStyle/>
           <a:p>
@@ -5019,6 +5031,25 @@
               </a:rPr>
               <a:t>https://github.com/ArjanBakr/wmugsat/blob/master/Docs/WMUG%20Saturday%20-%20ImageBuilder.docx</a:t>
             </a:r>
+            <a:br>
+              <a:rPr lang="en-US" dirty="0"/>
+            </a:br>
+            <a:r>
+              <a:rPr lang="en-US" dirty="0"/>
+              <a:t>or use this short URL: </a:t>
+            </a:r>
+            <a:br>
+              <a:rPr lang="en-US" dirty="0"/>
+            </a:br>
+            <a:r>
+              <a:rPr lang="en-US" dirty="0">
+                <a:hlinkClick r:id="rId4"/>
+              </a:rPr>
+              <a:t>https://bit.ly/2Kbshmx</a:t>
+            </a:r>
+            <a:br>
+              <a:rPr lang="en-US" dirty="0"/>
+            </a:br>
             <a:endParaRPr lang="en-US" dirty="0"/>
           </a:p>
           <a:p>
@@ -5058,7 +5089,7 @@
           <p:nvPr/>
         </p:nvPicPr>
         <p:blipFill>
-          <a:blip r:embed="rId4"/>
+          <a:blip r:embed="rId5"/>
           <a:stretch>
             <a:fillRect/>
           </a:stretch>
@@ -5073,6 +5104,52 @@
           </a:prstGeom>
         </p:spPr>
       </p:pic>
+      <p:sp>
+        <p:nvSpPr>
+          <p:cNvPr id="5" name="Tekstvak 4">
+            <a:extLst>
+              <a:ext uri="{FF2B5EF4-FFF2-40B4-BE49-F238E27FC236}">
+                <a16:creationId xmlns:a16="http://schemas.microsoft.com/office/drawing/2014/main" id="{CC5C956E-32C1-4F18-8F22-16CBC96FF813}"/>
+              </a:ext>
+            </a:extLst>
+          </p:cNvPr>
+          <p:cNvSpPr txBox="1"/>
+          <p:nvPr/>
+        </p:nvSpPr>
+        <p:spPr>
+          <a:xfrm>
+            <a:off x="8275782" y="4765964"/>
+            <a:ext cx="2957484" cy="646331"/>
+          </a:xfrm>
+          <a:prstGeom prst="rect">
+            <a:avLst/>
+          </a:prstGeom>
+          <a:noFill/>
+        </p:spPr>
+        <p:txBody>
+          <a:bodyPr wrap="square" rtlCol="0">
+            <a:spAutoFit/>
+          </a:bodyPr>
+          <a:lstStyle/>
+          <a:p>
+            <a:r>
+              <a:rPr lang="en-US" dirty="0"/>
+              <a:t>Password for Student:</a:t>
+            </a:r>
+          </a:p>
+          <a:p>
+            <a:r>
+              <a:rPr lang="en-US" dirty="0" err="1"/>
+              <a:t>AzurePa</a:t>
+            </a:r>
+            <a:r>
+              <a:rPr lang="en-US" dirty="0"/>
+              <a:t>$$w0rd</a:t>
+            </a:r>
+            <a:endParaRPr lang="nl-NL" dirty="0"/>
+          </a:p>
+        </p:txBody>
+      </p:sp>
     </p:spTree>
     <p:extLst>
       <p:ext uri="{BB962C8B-B14F-4D97-AF65-F5344CB8AC3E}">
@@ -5922,9 +5999,12 @@
 </file>
 
 <file path=customXml/item1.xml><?xml version="1.0" encoding="utf-8"?>
-<p:properties xmlns:p="http://schemas.microsoft.com/office/2006/metadata/properties" xmlns:xsi="http://www.w3.org/2001/XMLSchema-instance" xmlns:pc="http://schemas.microsoft.com/office/infopath/2007/PartnerControls">
-  <documentManagement/>
-</p:properties>
+<?mso-contentType ?>
+<FormTemplates xmlns="http://schemas.microsoft.com/sharepoint/v3/contenttype/forms">
+  <Display>DocumentLibraryForm</Display>
+  <Edit>DocumentLibraryForm</Edit>
+  <New>DocumentLibraryForm</New>
+</FormTemplates>
 </file>
 
 <file path=customXml/item2.xml><?xml version="1.0" encoding="utf-8"?>
@@ -6113,27 +6193,15 @@
 </file>
 
 <file path=customXml/item3.xml><?xml version="1.0" encoding="utf-8"?>
-<?mso-contentType ?>
-<FormTemplates xmlns="http://schemas.microsoft.com/sharepoint/v3/contenttype/forms">
-  <Display>DocumentLibraryForm</Display>
-  <Edit>DocumentLibraryForm</Edit>
-  <New>DocumentLibraryForm</New>
-</FormTemplates>
+<p:properties xmlns:p="http://schemas.microsoft.com/office/2006/metadata/properties" xmlns:xsi="http://www.w3.org/2001/XMLSchema-instance" xmlns:pc="http://schemas.microsoft.com/office/infopath/2007/PartnerControls">
+  <documentManagement/>
+</p:properties>
 </file>
 
 <file path=customXml/itemProps1.xml><?xml version="1.0" encoding="utf-8"?>
-<ds:datastoreItem xmlns:ds="http://schemas.openxmlformats.org/officeDocument/2006/customXml" ds:itemID="{4B8AAFD7-28F9-4B71-9BE8-8546B634AADB}">
+<ds:datastoreItem xmlns:ds="http://schemas.openxmlformats.org/officeDocument/2006/customXml" ds:itemID="{7B88DD9A-920D-46EF-815C-92E4AE054E85}">
   <ds:schemaRefs>
-    <ds:schemaRef ds:uri="f9901165-8243-4fa7-8511-c540171c1663"/>
-    <ds:schemaRef ds:uri="http://schemas.microsoft.com/office/2006/documentManagement/types"/>
-    <ds:schemaRef ds:uri="http://schemas.microsoft.com/office/infopath/2007/PartnerControls"/>
-    <ds:schemaRef ds:uri="ad47b762-31d4-4065-99ec-d5752abd1960"/>
-    <ds:schemaRef ds:uri="http://purl.org/dc/elements/1.1/"/>
-    <ds:schemaRef ds:uri="http://schemas.microsoft.com/office/2006/metadata/properties"/>
-    <ds:schemaRef ds:uri="http://purl.org/dc/terms/"/>
-    <ds:schemaRef ds:uri="http://schemas.openxmlformats.org/package/2006/metadata/core-properties"/>
-    <ds:schemaRef ds:uri="http://www.w3.org/XML/1998/namespace"/>
-    <ds:schemaRef ds:uri="http://purl.org/dc/dcmitype/"/>
+    <ds:schemaRef ds:uri="http://schemas.microsoft.com/sharepoint/v3/contenttype/forms"/>
   </ds:schemaRefs>
 </ds:datastoreItem>
 </file>
@@ -6158,9 +6226,18 @@
 </file>
 
 <file path=customXml/itemProps3.xml><?xml version="1.0" encoding="utf-8"?>
-<ds:datastoreItem xmlns:ds="http://schemas.openxmlformats.org/officeDocument/2006/customXml" ds:itemID="{7B88DD9A-920D-46EF-815C-92E4AE054E85}">
+<ds:datastoreItem xmlns:ds="http://schemas.openxmlformats.org/officeDocument/2006/customXml" ds:itemID="{4B8AAFD7-28F9-4B71-9BE8-8546B634AADB}">
   <ds:schemaRefs>
-    <ds:schemaRef ds:uri="http://schemas.microsoft.com/sharepoint/v3/contenttype/forms"/>
+    <ds:schemaRef ds:uri="f9901165-8243-4fa7-8511-c540171c1663"/>
+    <ds:schemaRef ds:uri="http://schemas.microsoft.com/office/2006/documentManagement/types"/>
+    <ds:schemaRef ds:uri="http://schemas.microsoft.com/office/infopath/2007/PartnerControls"/>
+    <ds:schemaRef ds:uri="ad47b762-31d4-4065-99ec-d5752abd1960"/>
+    <ds:schemaRef ds:uri="http://purl.org/dc/elements/1.1/"/>
+    <ds:schemaRef ds:uri="http://schemas.microsoft.com/office/2006/metadata/properties"/>
+    <ds:schemaRef ds:uri="http://purl.org/dc/terms/"/>
+    <ds:schemaRef ds:uri="http://schemas.openxmlformats.org/package/2006/metadata/core-properties"/>
+    <ds:schemaRef ds:uri="http://www.w3.org/XML/1998/namespace"/>
+    <ds:schemaRef ds:uri="http://purl.org/dc/dcmitype/"/>
   </ds:schemaRefs>
 </ds:datastoreItem>
 </file>
</xml_diff>